<commit_message>
adding slides for the rest of the mini lectures
</commit_message>
<xml_diff>
--- a/mini_lectures/Mini lectures.pptx
+++ b/mini_lectures/Mini lectures.pptx
@@ -10,6 +10,10 @@
     <p:sldId id="258" r:id="rId4"/>
     <p:sldId id="259" r:id="rId5"/>
     <p:sldId id="260" r:id="rId6"/>
+    <p:sldId id="261" r:id="rId7"/>
+    <p:sldId id="262" r:id="rId8"/>
+    <p:sldId id="263" r:id="rId9"/>
+    <p:sldId id="264" r:id="rId10"/>
   </p:sldIdLst>
   <p:sldSz cx="12192000" cy="6858000"/>
   <p:notesSz cx="6858000" cy="9144000"/>
@@ -108,6 +112,11 @@
       </a:defRPr>
     </a:lvl9pPr>
   </p:defaultTextStyle>
+  <p:extLst>
+    <p:ext uri="{EFAFB233-063F-42B5-8137-9DF3F51BA10A}">
+      <p15:sldGuideLst xmlns:p15="http://schemas.microsoft.com/office/powerpoint/2012/main"/>
+    </p:ext>
+  </p:extLst>
 </p:presentation>
 </file>
 
@@ -161,7 +170,7 @@
           <a:noFill/>
           <a:extLst>
             <a:ext uri="{909E8E84-426E-40dd-AFC4-6F175D3DCCD1}">
-              <a14:hiddenFill xmlns:a14="http://schemas.microsoft.com/office/drawing/2010/main" xmlns="">
+              <a14:hiddenFill xmlns="" xmlns:a14="http://schemas.microsoft.com/office/drawing/2010/main">
                 <a:solidFill>
                   <a:srgbClr val="FFFFFF"/>
                 </a:solidFill>
@@ -221,7 +230,7 @@
             </a:ln>
             <a:extLst>
               <a:ext uri="{91240B29-F687-4f45-9708-019B960494DF}">
-                <a14:hiddenLine xmlns:a14="http://schemas.microsoft.com/office/drawing/2010/main" xmlns="" w="9525">
+                <a14:hiddenLine xmlns="" xmlns:a14="http://schemas.microsoft.com/office/drawing/2010/main" w="9525">
                   <a:solidFill>
                     <a:srgbClr val="000000"/>
                   </a:solidFill>
@@ -311,7 +320,7 @@
             </a:ln>
             <a:extLst>
               <a:ext uri="{91240B29-F687-4f45-9708-019B960494DF}">
-                <a14:hiddenLine xmlns:a14="http://schemas.microsoft.com/office/drawing/2010/main" xmlns="" w="9525">
+                <a14:hiddenLine xmlns="" xmlns:a14="http://schemas.microsoft.com/office/drawing/2010/main" w="9525">
                   <a:solidFill>
                     <a:srgbClr val="000000"/>
                   </a:solidFill>
@@ -401,7 +410,7 @@
             </a:ln>
             <a:extLst>
               <a:ext uri="{91240B29-F687-4f45-9708-019B960494DF}">
-                <a14:hiddenLine xmlns:a14="http://schemas.microsoft.com/office/drawing/2010/main" xmlns="" w="9525">
+                <a14:hiddenLine xmlns="" xmlns:a14="http://schemas.microsoft.com/office/drawing/2010/main" w="9525">
                   <a:solidFill>
                     <a:srgbClr val="000000"/>
                   </a:solidFill>
@@ -435,7 +444,7 @@
             </a:ln>
             <a:extLst>
               <a:ext uri="{91240B29-F687-4f45-9708-019B960494DF}">
-                <a14:hiddenLine xmlns:a14="http://schemas.microsoft.com/office/drawing/2010/main" xmlns="" w="9525">
+                <a14:hiddenLine xmlns="" xmlns:a14="http://schemas.microsoft.com/office/drawing/2010/main" w="9525">
                   <a:solidFill>
                     <a:srgbClr val="000000"/>
                   </a:solidFill>
@@ -525,7 +534,7 @@
             </a:ln>
             <a:extLst>
               <a:ext uri="{91240B29-F687-4f45-9708-019B960494DF}">
-                <a14:hiddenLine xmlns:a14="http://schemas.microsoft.com/office/drawing/2010/main" xmlns="" w="9525">
+                <a14:hiddenLine xmlns="" xmlns:a14="http://schemas.microsoft.com/office/drawing/2010/main" w="9525">
                   <a:solidFill>
                     <a:srgbClr val="000000"/>
                   </a:solidFill>
@@ -587,7 +596,7 @@
             </a:ln>
             <a:extLst>
               <a:ext uri="{91240B29-F687-4f45-9708-019B960494DF}">
-                <a14:hiddenLine xmlns:a14="http://schemas.microsoft.com/office/drawing/2010/main" xmlns="" w="9525">
+                <a14:hiddenLine xmlns="" xmlns:a14="http://schemas.microsoft.com/office/drawing/2010/main" w="9525">
                   <a:solidFill>
                     <a:srgbClr val="000000"/>
                   </a:solidFill>
@@ -649,7 +658,7 @@
             </a:ln>
             <a:extLst>
               <a:ext uri="{91240B29-F687-4f45-9708-019B960494DF}">
-                <a14:hiddenLine xmlns:a14="http://schemas.microsoft.com/office/drawing/2010/main" xmlns="" w="9525">
+                <a14:hiddenLine xmlns="" xmlns:a14="http://schemas.microsoft.com/office/drawing/2010/main" w="9525">
                   <a:solidFill>
                     <a:srgbClr val="000000"/>
                   </a:solidFill>
@@ -739,7 +748,7 @@
             </a:ln>
             <a:extLst>
               <a:ext uri="{91240B29-F687-4f45-9708-019B960494DF}">
-                <a14:hiddenLine xmlns:a14="http://schemas.microsoft.com/office/drawing/2010/main" xmlns="" w="9525">
+                <a14:hiddenLine xmlns="" xmlns:a14="http://schemas.microsoft.com/office/drawing/2010/main" w="9525">
                   <a:solidFill>
                     <a:srgbClr val="000000"/>
                   </a:solidFill>
@@ -801,7 +810,7 @@
             </a:ln>
             <a:extLst>
               <a:ext uri="{91240B29-F687-4f45-9708-019B960494DF}">
-                <a14:hiddenLine xmlns:a14="http://schemas.microsoft.com/office/drawing/2010/main" xmlns="" w="9525">
+                <a14:hiddenLine xmlns="" xmlns:a14="http://schemas.microsoft.com/office/drawing/2010/main" w="9525">
                   <a:solidFill>
                     <a:srgbClr val="000000"/>
                   </a:solidFill>
@@ -863,7 +872,7 @@
             </a:ln>
             <a:extLst>
               <a:ext uri="{91240B29-F687-4f45-9708-019B960494DF}">
-                <a14:hiddenLine xmlns:a14="http://schemas.microsoft.com/office/drawing/2010/main" xmlns="" w="9525">
+                <a14:hiddenLine xmlns="" xmlns:a14="http://schemas.microsoft.com/office/drawing/2010/main" w="9525">
                   <a:solidFill>
                     <a:srgbClr val="000000"/>
                   </a:solidFill>
@@ -953,7 +962,7 @@
             </a:ln>
             <a:extLst>
               <a:ext uri="{91240B29-F687-4f45-9708-019B960494DF}">
-                <a14:hiddenLine xmlns:a14="http://schemas.microsoft.com/office/drawing/2010/main" xmlns="" w="9525">
+                <a14:hiddenLine xmlns="" xmlns:a14="http://schemas.microsoft.com/office/drawing/2010/main" w="9525">
                   <a:solidFill>
                     <a:srgbClr val="000000"/>
                   </a:solidFill>
@@ -1043,7 +1052,7 @@
             </a:ln>
             <a:extLst>
               <a:ext uri="{91240B29-F687-4f45-9708-019B960494DF}">
-                <a14:hiddenLine xmlns:a14="http://schemas.microsoft.com/office/drawing/2010/main" xmlns="" w="9525">
+                <a14:hiddenLine xmlns="" xmlns:a14="http://schemas.microsoft.com/office/drawing/2010/main" w="9525">
                   <a:solidFill>
                     <a:srgbClr val="000000"/>
                   </a:solidFill>
@@ -1105,7 +1114,7 @@
             </a:ln>
             <a:extLst>
               <a:ext uri="{91240B29-F687-4f45-9708-019B960494DF}">
-                <a14:hiddenLine xmlns:a14="http://schemas.microsoft.com/office/drawing/2010/main" xmlns="" w="9525">
+                <a14:hiddenLine xmlns="" xmlns:a14="http://schemas.microsoft.com/office/drawing/2010/main" w="9525">
                   <a:solidFill>
                     <a:srgbClr val="000000"/>
                   </a:solidFill>
@@ -1215,7 +1224,7 @@
             </a:ln>
             <a:extLst>
               <a:ext uri="{91240B29-F687-4f45-9708-019B960494DF}">
-                <a14:hiddenLine xmlns:a14="http://schemas.microsoft.com/office/drawing/2010/main" xmlns="" w="9525">
+                <a14:hiddenLine xmlns="" xmlns:a14="http://schemas.microsoft.com/office/drawing/2010/main" w="9525">
                   <a:solidFill>
                     <a:srgbClr val="000000"/>
                   </a:solidFill>
@@ -1277,7 +1286,7 @@
             </a:ln>
             <a:extLst>
               <a:ext uri="{91240B29-F687-4f45-9708-019B960494DF}">
-                <a14:hiddenLine xmlns:a14="http://schemas.microsoft.com/office/drawing/2010/main" xmlns="" w="9525">
+                <a14:hiddenLine xmlns="" xmlns:a14="http://schemas.microsoft.com/office/drawing/2010/main" w="9525">
                   <a:solidFill>
                     <a:srgbClr val="000000"/>
                   </a:solidFill>
@@ -1367,7 +1376,7 @@
             </a:ln>
             <a:extLst>
               <a:ext uri="{91240B29-F687-4f45-9708-019B960494DF}">
-                <a14:hiddenLine xmlns:a14="http://schemas.microsoft.com/office/drawing/2010/main" xmlns="" w="9525">
+                <a14:hiddenLine xmlns="" xmlns:a14="http://schemas.microsoft.com/office/drawing/2010/main" w="9525">
                   <a:solidFill>
                     <a:srgbClr val="000000"/>
                   </a:solidFill>
@@ -1457,7 +1466,7 @@
             </a:ln>
             <a:extLst>
               <a:ext uri="{91240B29-F687-4f45-9708-019B960494DF}">
-                <a14:hiddenLine xmlns:a14="http://schemas.microsoft.com/office/drawing/2010/main" xmlns="" w="9525">
+                <a14:hiddenLine xmlns="" xmlns:a14="http://schemas.microsoft.com/office/drawing/2010/main" w="9525">
                   <a:solidFill>
                     <a:srgbClr val="000000"/>
                   </a:solidFill>
@@ -1519,7 +1528,7 @@
             </a:ln>
             <a:extLst>
               <a:ext uri="{91240B29-F687-4f45-9708-019B960494DF}">
-                <a14:hiddenLine xmlns:a14="http://schemas.microsoft.com/office/drawing/2010/main" xmlns="" w="9525">
+                <a14:hiddenLine xmlns="" xmlns:a14="http://schemas.microsoft.com/office/drawing/2010/main" w="9525">
                   <a:solidFill>
                     <a:srgbClr val="000000"/>
                   </a:solidFill>
@@ -1609,7 +1618,7 @@
             </a:ln>
             <a:extLst>
               <a:ext uri="{91240B29-F687-4f45-9708-019B960494DF}">
-                <a14:hiddenLine xmlns:a14="http://schemas.microsoft.com/office/drawing/2010/main" xmlns="" w="9525">
+                <a14:hiddenLine xmlns="" xmlns:a14="http://schemas.microsoft.com/office/drawing/2010/main" w="9525">
                   <a:solidFill>
                     <a:srgbClr val="000000"/>
                   </a:solidFill>
@@ -1699,7 +1708,7 @@
             </a:ln>
             <a:extLst>
               <a:ext uri="{91240B29-F687-4f45-9708-019B960494DF}">
-                <a14:hiddenLine xmlns:a14="http://schemas.microsoft.com/office/drawing/2010/main" xmlns="" w="9525">
+                <a14:hiddenLine xmlns="" xmlns:a14="http://schemas.microsoft.com/office/drawing/2010/main" w="9525">
                   <a:solidFill>
                     <a:srgbClr val="000000"/>
                   </a:solidFill>
@@ -1755,7 +1764,7 @@
             </a:ln>
             <a:extLst>
               <a:ext uri="{91240B29-F687-4f45-9708-019B960494DF}">
-                <a14:hiddenLine xmlns:a14="http://schemas.microsoft.com/office/drawing/2010/main" xmlns="" w="9525">
+                <a14:hiddenLine xmlns="" xmlns:a14="http://schemas.microsoft.com/office/drawing/2010/main" w="9525">
                   <a:solidFill>
                     <a:srgbClr val="000000"/>
                   </a:solidFill>
@@ -1845,7 +1854,7 @@
             </a:ln>
             <a:extLst>
               <a:ext uri="{91240B29-F687-4f45-9708-019B960494DF}">
-                <a14:hiddenLine xmlns:a14="http://schemas.microsoft.com/office/drawing/2010/main" xmlns="" w="9525">
+                <a14:hiddenLine xmlns="" xmlns:a14="http://schemas.microsoft.com/office/drawing/2010/main" w="9525">
                   <a:solidFill>
                     <a:srgbClr val="000000"/>
                   </a:solidFill>
@@ -1901,7 +1910,7 @@
             </a:ln>
             <a:extLst>
               <a:ext uri="{91240B29-F687-4f45-9708-019B960494DF}">
-                <a14:hiddenLine xmlns:a14="http://schemas.microsoft.com/office/drawing/2010/main" xmlns="" w="9525">
+                <a14:hiddenLine xmlns="" xmlns:a14="http://schemas.microsoft.com/office/drawing/2010/main" w="9525">
                   <a:solidFill>
                     <a:srgbClr val="000000"/>
                   </a:solidFill>
@@ -1991,7 +2000,7 @@
             </a:ln>
             <a:extLst>
               <a:ext uri="{91240B29-F687-4f45-9708-019B960494DF}">
-                <a14:hiddenLine xmlns:a14="http://schemas.microsoft.com/office/drawing/2010/main" xmlns="" w="9525">
+                <a14:hiddenLine xmlns="" xmlns:a14="http://schemas.microsoft.com/office/drawing/2010/main" w="9525">
                   <a:solidFill>
                     <a:srgbClr val="000000"/>
                   </a:solidFill>
@@ -2059,7 +2068,7 @@
             </a:ln>
             <a:extLst>
               <a:ext uri="{91240B29-F687-4f45-9708-019B960494DF}">
-                <a14:hiddenLine xmlns:a14="http://schemas.microsoft.com/office/drawing/2010/main" xmlns="" w="9525">
+                <a14:hiddenLine xmlns="" xmlns:a14="http://schemas.microsoft.com/office/drawing/2010/main" w="9525">
                   <a:solidFill>
                     <a:srgbClr val="000000"/>
                   </a:solidFill>
@@ -2149,7 +2158,7 @@
             </a:ln>
             <a:extLst>
               <a:ext uri="{91240B29-F687-4f45-9708-019B960494DF}">
-                <a14:hiddenLine xmlns:a14="http://schemas.microsoft.com/office/drawing/2010/main" xmlns="" w="9525">
+                <a14:hiddenLine xmlns="" xmlns:a14="http://schemas.microsoft.com/office/drawing/2010/main" w="9525">
                   <a:solidFill>
                     <a:srgbClr val="000000"/>
                   </a:solidFill>
@@ -2217,7 +2226,7 @@
             </a:ln>
             <a:extLst>
               <a:ext uri="{91240B29-F687-4f45-9708-019B960494DF}">
-                <a14:hiddenLine xmlns:a14="http://schemas.microsoft.com/office/drawing/2010/main" xmlns="" w="9525">
+                <a14:hiddenLine xmlns="" xmlns:a14="http://schemas.microsoft.com/office/drawing/2010/main" w="9525">
                   <a:solidFill>
                     <a:srgbClr val="000000"/>
                   </a:solidFill>
@@ -2307,7 +2316,7 @@
             </a:ln>
             <a:extLst>
               <a:ext uri="{91240B29-F687-4f45-9708-019B960494DF}">
-                <a14:hiddenLine xmlns:a14="http://schemas.microsoft.com/office/drawing/2010/main" xmlns="" w="9525">
+                <a14:hiddenLine xmlns="" xmlns:a14="http://schemas.microsoft.com/office/drawing/2010/main" w="9525">
                   <a:solidFill>
                     <a:srgbClr val="000000"/>
                   </a:solidFill>
@@ -2341,7 +2350,7 @@
             </a:ln>
             <a:extLst>
               <a:ext uri="{91240B29-F687-4f45-9708-019B960494DF}">
-                <a14:hiddenLine xmlns:a14="http://schemas.microsoft.com/office/drawing/2010/main" xmlns="" w="9525">
+                <a14:hiddenLine xmlns="" xmlns:a14="http://schemas.microsoft.com/office/drawing/2010/main" w="9525">
                   <a:solidFill>
                     <a:srgbClr val="000000"/>
                   </a:solidFill>
@@ -2431,7 +2440,7 @@
             </a:ln>
             <a:extLst>
               <a:ext uri="{91240B29-F687-4f45-9708-019B960494DF}">
-                <a14:hiddenLine xmlns:a14="http://schemas.microsoft.com/office/drawing/2010/main" xmlns="" w="9525">
+                <a14:hiddenLine xmlns="" xmlns:a14="http://schemas.microsoft.com/office/drawing/2010/main" w="9525">
                   <a:solidFill>
                     <a:srgbClr val="000000"/>
                   </a:solidFill>
@@ -2493,7 +2502,7 @@
             </a:ln>
             <a:extLst>
               <a:ext uri="{91240B29-F687-4f45-9708-019B960494DF}">
-                <a14:hiddenLine xmlns:a14="http://schemas.microsoft.com/office/drawing/2010/main" xmlns="" w="9525">
+                <a14:hiddenLine xmlns="" xmlns:a14="http://schemas.microsoft.com/office/drawing/2010/main" w="9525">
                   <a:solidFill>
                     <a:srgbClr val="000000"/>
                   </a:solidFill>
@@ -2555,7 +2564,7 @@
             </a:ln>
             <a:extLst>
               <a:ext uri="{91240B29-F687-4f45-9708-019B960494DF}">
-                <a14:hiddenLine xmlns:a14="http://schemas.microsoft.com/office/drawing/2010/main" xmlns="" w="9525">
+                <a14:hiddenLine xmlns="" xmlns:a14="http://schemas.microsoft.com/office/drawing/2010/main" w="9525">
                   <a:solidFill>
                     <a:srgbClr val="000000"/>
                   </a:solidFill>
@@ -2645,7 +2654,7 @@
             </a:ln>
             <a:extLst>
               <a:ext uri="{91240B29-F687-4f45-9708-019B960494DF}">
-                <a14:hiddenLine xmlns:a14="http://schemas.microsoft.com/office/drawing/2010/main" xmlns="" w="9525">
+                <a14:hiddenLine xmlns="" xmlns:a14="http://schemas.microsoft.com/office/drawing/2010/main" w="9525">
                   <a:solidFill>
                     <a:srgbClr val="000000"/>
                   </a:solidFill>
@@ -2713,7 +2722,7 @@
             </a:ln>
             <a:extLst>
               <a:ext uri="{91240B29-F687-4f45-9708-019B960494DF}">
-                <a14:hiddenLine xmlns:a14="http://schemas.microsoft.com/office/drawing/2010/main" xmlns="" w="9525">
+                <a14:hiddenLine xmlns="" xmlns:a14="http://schemas.microsoft.com/office/drawing/2010/main" w="9525">
                   <a:solidFill>
                     <a:srgbClr val="000000"/>
                   </a:solidFill>
@@ -2775,7 +2784,7 @@
             </a:ln>
             <a:extLst>
               <a:ext uri="{91240B29-F687-4f45-9708-019B960494DF}">
-                <a14:hiddenLine xmlns:a14="http://schemas.microsoft.com/office/drawing/2010/main" xmlns="" w="9525">
+                <a14:hiddenLine xmlns="" xmlns:a14="http://schemas.microsoft.com/office/drawing/2010/main" w="9525">
                   <a:solidFill>
                     <a:srgbClr val="000000"/>
                   </a:solidFill>
@@ -2865,7 +2874,7 @@
             </a:ln>
             <a:extLst>
               <a:ext uri="{91240B29-F687-4f45-9708-019B960494DF}">
-                <a14:hiddenLine xmlns:a14="http://schemas.microsoft.com/office/drawing/2010/main" xmlns="" w="9525">
+                <a14:hiddenLine xmlns="" xmlns:a14="http://schemas.microsoft.com/office/drawing/2010/main" w="9525">
                   <a:solidFill>
                     <a:srgbClr val="000000"/>
                   </a:solidFill>
@@ -2927,7 +2936,7 @@
             </a:ln>
             <a:extLst>
               <a:ext uri="{91240B29-F687-4f45-9708-019B960494DF}">
-                <a14:hiddenLine xmlns:a14="http://schemas.microsoft.com/office/drawing/2010/main" xmlns="" w="9525">
+                <a14:hiddenLine xmlns="" xmlns:a14="http://schemas.microsoft.com/office/drawing/2010/main" w="9525">
                   <a:solidFill>
                     <a:srgbClr val="000000"/>
                   </a:solidFill>
@@ -3017,7 +3026,7 @@
             </a:ln>
             <a:extLst>
               <a:ext uri="{91240B29-F687-4f45-9708-019B960494DF}">
-                <a14:hiddenLine xmlns:a14="http://schemas.microsoft.com/office/drawing/2010/main" xmlns="" w="9525">
+                <a14:hiddenLine xmlns="" xmlns:a14="http://schemas.microsoft.com/office/drawing/2010/main" w="9525">
                   <a:solidFill>
                     <a:srgbClr val="000000"/>
                   </a:solidFill>
@@ -3079,7 +3088,7 @@
             </a:ln>
             <a:extLst>
               <a:ext uri="{91240B29-F687-4f45-9708-019B960494DF}">
-                <a14:hiddenLine xmlns:a14="http://schemas.microsoft.com/office/drawing/2010/main" xmlns="" w="9525">
+                <a14:hiddenLine xmlns="" xmlns:a14="http://schemas.microsoft.com/office/drawing/2010/main" w="9525">
                   <a:solidFill>
                     <a:srgbClr val="000000"/>
                   </a:solidFill>
@@ -3169,7 +3178,7 @@
             </a:ln>
             <a:extLst>
               <a:ext uri="{91240B29-F687-4f45-9708-019B960494DF}">
-                <a14:hiddenLine xmlns:a14="http://schemas.microsoft.com/office/drawing/2010/main" xmlns="" w="9525">
+                <a14:hiddenLine xmlns="" xmlns:a14="http://schemas.microsoft.com/office/drawing/2010/main" w="9525">
                   <a:solidFill>
                     <a:srgbClr val="000000"/>
                   </a:solidFill>
@@ -3203,7 +3212,7 @@
             </a:ln>
             <a:extLst>
               <a:ext uri="{91240B29-F687-4f45-9708-019B960494DF}">
-                <a14:hiddenLine xmlns:a14="http://schemas.microsoft.com/office/drawing/2010/main" xmlns="" w="9525">
+                <a14:hiddenLine xmlns="" xmlns:a14="http://schemas.microsoft.com/office/drawing/2010/main" w="9525">
                   <a:solidFill>
                     <a:srgbClr val="000000"/>
                   </a:solidFill>
@@ -3268,7 +3277,7 @@
             </a:ln>
             <a:extLst>
               <a:ext uri="{91240B29-F687-4f45-9708-019B960494DF}">
-                <a14:hiddenLine xmlns:a14="http://schemas.microsoft.com/office/drawing/2010/main" xmlns="" w="9525">
+                <a14:hiddenLine xmlns="" xmlns:a14="http://schemas.microsoft.com/office/drawing/2010/main" w="9525">
                   <a:solidFill>
                     <a:srgbClr val="000000"/>
                   </a:solidFill>
@@ -3358,7 +3367,7 @@
             </a:ln>
             <a:extLst>
               <a:ext uri="{91240B29-F687-4f45-9708-019B960494DF}">
-                <a14:hiddenLine xmlns:a14="http://schemas.microsoft.com/office/drawing/2010/main" xmlns="" w="9525">
+                <a14:hiddenLine xmlns="" xmlns:a14="http://schemas.microsoft.com/office/drawing/2010/main" w="9525">
                   <a:solidFill>
                     <a:srgbClr val="000000"/>
                   </a:solidFill>
@@ -3420,7 +3429,7 @@
             </a:ln>
             <a:extLst>
               <a:ext uri="{91240B29-F687-4f45-9708-019B960494DF}">
-                <a14:hiddenLine xmlns:a14="http://schemas.microsoft.com/office/drawing/2010/main" xmlns="" w="9525">
+                <a14:hiddenLine xmlns="" xmlns:a14="http://schemas.microsoft.com/office/drawing/2010/main" w="9525">
                   <a:solidFill>
                     <a:srgbClr val="000000"/>
                   </a:solidFill>
@@ -3510,7 +3519,7 @@
             </a:ln>
             <a:extLst>
               <a:ext uri="{91240B29-F687-4f45-9708-019B960494DF}">
-                <a14:hiddenLine xmlns:a14="http://schemas.microsoft.com/office/drawing/2010/main" xmlns="" w="9525">
+                <a14:hiddenLine xmlns="" xmlns:a14="http://schemas.microsoft.com/office/drawing/2010/main" w="9525">
                   <a:solidFill>
                     <a:srgbClr val="000000"/>
                   </a:solidFill>
@@ -3600,7 +3609,7 @@
             </a:ln>
             <a:extLst>
               <a:ext uri="{91240B29-F687-4f45-9708-019B960494DF}">
-                <a14:hiddenLine xmlns:a14="http://schemas.microsoft.com/office/drawing/2010/main" xmlns="" w="9525">
+                <a14:hiddenLine xmlns="" xmlns:a14="http://schemas.microsoft.com/office/drawing/2010/main" w="9525">
                   <a:solidFill>
                     <a:srgbClr val="000000"/>
                   </a:solidFill>
@@ -3665,7 +3674,7 @@
             </a:ln>
             <a:extLst>
               <a:ext uri="{91240B29-F687-4f45-9708-019B960494DF}">
-                <a14:hiddenLine xmlns:a14="http://schemas.microsoft.com/office/drawing/2010/main" xmlns="" w="9525">
+                <a14:hiddenLine xmlns="" xmlns:a14="http://schemas.microsoft.com/office/drawing/2010/main" w="9525">
                   <a:solidFill>
                     <a:srgbClr val="000000"/>
                   </a:solidFill>
@@ -3727,7 +3736,7 @@
             </a:ln>
             <a:extLst>
               <a:ext uri="{91240B29-F687-4f45-9708-019B960494DF}">
-                <a14:hiddenLine xmlns:a14="http://schemas.microsoft.com/office/drawing/2010/main" xmlns="" w="9525">
+                <a14:hiddenLine xmlns="" xmlns:a14="http://schemas.microsoft.com/office/drawing/2010/main" w="9525">
                   <a:solidFill>
                     <a:srgbClr val="000000"/>
                   </a:solidFill>
@@ -3817,7 +3826,7 @@
             </a:ln>
             <a:extLst>
               <a:ext uri="{91240B29-F687-4f45-9708-019B960494DF}">
-                <a14:hiddenLine xmlns:a14="http://schemas.microsoft.com/office/drawing/2010/main" xmlns="" w="9525">
+                <a14:hiddenLine xmlns="" xmlns:a14="http://schemas.microsoft.com/office/drawing/2010/main" w="9525">
                   <a:solidFill>
                     <a:srgbClr val="000000"/>
                   </a:solidFill>
@@ -3907,7 +3916,7 @@
             </a:ln>
             <a:extLst>
               <a:ext uri="{91240B29-F687-4f45-9708-019B960494DF}">
-                <a14:hiddenLine xmlns:a14="http://schemas.microsoft.com/office/drawing/2010/main" xmlns="" w="9525">
+                <a14:hiddenLine xmlns="" xmlns:a14="http://schemas.microsoft.com/office/drawing/2010/main" w="9525">
                   <a:solidFill>
                     <a:srgbClr val="000000"/>
                   </a:solidFill>
@@ -3969,7 +3978,7 @@
             </a:ln>
             <a:extLst>
               <a:ext uri="{91240B29-F687-4f45-9708-019B960494DF}">
-                <a14:hiddenLine xmlns:a14="http://schemas.microsoft.com/office/drawing/2010/main" xmlns="" w="9525">
+                <a14:hiddenLine xmlns="" xmlns:a14="http://schemas.microsoft.com/office/drawing/2010/main" w="9525">
                   <a:solidFill>
                     <a:srgbClr val="000000"/>
                   </a:solidFill>
@@ -4089,7 +4098,7 @@
             </a:ln>
             <a:extLst>
               <a:ext uri="{91240B29-F687-4f45-9708-019B960494DF}">
-                <a14:hiddenLine xmlns:a14="http://schemas.microsoft.com/office/drawing/2010/main" xmlns="" w="9525">
+                <a14:hiddenLine xmlns="" xmlns:a14="http://schemas.microsoft.com/office/drawing/2010/main" w="9525">
                   <a:solidFill>
                     <a:srgbClr val="000000"/>
                   </a:solidFill>
@@ -4157,7 +4166,7 @@
             </a:ln>
             <a:extLst>
               <a:ext uri="{91240B29-F687-4f45-9708-019B960494DF}">
-                <a14:hiddenLine xmlns:a14="http://schemas.microsoft.com/office/drawing/2010/main" xmlns="" w="9525">
+                <a14:hiddenLine xmlns="" xmlns:a14="http://schemas.microsoft.com/office/drawing/2010/main" w="9525">
                   <a:solidFill>
                     <a:srgbClr val="000000"/>
                   </a:solidFill>
@@ -4247,7 +4256,7 @@
             </a:ln>
             <a:extLst>
               <a:ext uri="{91240B29-F687-4f45-9708-019B960494DF}">
-                <a14:hiddenLine xmlns:a14="http://schemas.microsoft.com/office/drawing/2010/main" xmlns="" w="9525">
+                <a14:hiddenLine xmlns="" xmlns:a14="http://schemas.microsoft.com/office/drawing/2010/main" w="9525">
                   <a:solidFill>
                     <a:srgbClr val="000000"/>
                   </a:solidFill>
@@ -4388,7 +4397,7 @@
             <a:fld id="{B61BEF0D-F0BB-DE4B-95CE-6DB70DBA9567}" type="datetimeFigureOut">
               <a:rPr lang="en-US" smtClean="0"/>
               <a:pPr/>
-              <a:t>10/16/2019</a:t>
+              <a:t>10/17/2019</a:t>
             </a:fld>
             <a:endParaRPr lang="en-US" dirty="0"/>
           </a:p>
@@ -4657,7 +4666,7 @@
             <a:fld id="{B61BEF0D-F0BB-DE4B-95CE-6DB70DBA9567}" type="datetimeFigureOut">
               <a:rPr lang="en-US" smtClean="0"/>
               <a:pPr/>
-              <a:t>10/16/2019</a:t>
+              <a:t>10/17/2019</a:t>
             </a:fld>
             <a:endParaRPr lang="en-US" dirty="0"/>
           </a:p>
@@ -4855,7 +4864,7 @@
             <a:fld id="{B61BEF0D-F0BB-DE4B-95CE-6DB70DBA9567}" type="datetimeFigureOut">
               <a:rPr lang="en-US" smtClean="0"/>
               <a:pPr/>
-              <a:t>10/16/2019</a:t>
+              <a:t>10/17/2019</a:t>
             </a:fld>
             <a:endParaRPr lang="en-US" dirty="0"/>
           </a:p>
@@ -5120,7 +5129,7 @@
             <a:fld id="{B61BEF0D-F0BB-DE4B-95CE-6DB70DBA9567}" type="datetimeFigureOut">
               <a:rPr lang="en-US" smtClean="0"/>
               <a:pPr/>
-              <a:t>10/16/2019</a:t>
+              <a:t>10/17/2019</a:t>
             </a:fld>
             <a:endParaRPr lang="en-US" dirty="0"/>
           </a:p>
@@ -5556,7 +5565,7 @@
             <a:fld id="{B61BEF0D-F0BB-DE4B-95CE-6DB70DBA9567}" type="datetimeFigureOut">
               <a:rPr lang="en-US" smtClean="0"/>
               <a:pPr/>
-              <a:t>10/16/2019</a:t>
+              <a:t>10/17/2019</a:t>
             </a:fld>
             <a:endParaRPr lang="en-US" dirty="0"/>
           </a:p>
@@ -6104,7 +6113,7 @@
             <a:fld id="{B61BEF0D-F0BB-DE4B-95CE-6DB70DBA9567}" type="datetimeFigureOut">
               <a:rPr lang="en-US" smtClean="0"/>
               <a:pPr/>
-              <a:t>10/16/2019</a:t>
+              <a:t>10/17/2019</a:t>
             </a:fld>
             <a:endParaRPr lang="en-US" dirty="0"/>
           </a:p>
@@ -6826,7 +6835,7 @@
             <a:fld id="{B61BEF0D-F0BB-DE4B-95CE-6DB70DBA9567}" type="datetimeFigureOut">
               <a:rPr lang="en-US" smtClean="0"/>
               <a:pPr/>
-              <a:t>10/16/2019</a:t>
+              <a:t>10/17/2019</a:t>
             </a:fld>
             <a:endParaRPr lang="en-US" dirty="0"/>
           </a:p>
@@ -6998,7 +7007,7 @@
             <a:fld id="{B61BEF0D-F0BB-DE4B-95CE-6DB70DBA9567}" type="datetimeFigureOut">
               <a:rPr lang="en-US" smtClean="0"/>
               <a:pPr/>
-              <a:t>10/16/2019</a:t>
+              <a:t>10/17/2019</a:t>
             </a:fld>
             <a:endParaRPr lang="en-US" dirty="0"/>
           </a:p>
@@ -7180,7 +7189,7 @@
             <a:fld id="{B61BEF0D-F0BB-DE4B-95CE-6DB70DBA9567}" type="datetimeFigureOut">
               <a:rPr lang="en-US" smtClean="0"/>
               <a:pPr/>
-              <a:t>10/16/2019</a:t>
+              <a:t>10/17/2019</a:t>
             </a:fld>
             <a:endParaRPr lang="en-US" dirty="0"/>
           </a:p>
@@ -7352,7 +7361,7 @@
             <a:fld id="{B61BEF0D-F0BB-DE4B-95CE-6DB70DBA9567}" type="datetimeFigureOut">
               <a:rPr lang="en-US" smtClean="0"/>
               <a:pPr/>
-              <a:t>10/16/2019</a:t>
+              <a:t>10/17/2019</a:t>
             </a:fld>
             <a:endParaRPr lang="en-US" dirty="0"/>
           </a:p>
@@ -7604,7 +7613,7 @@
             <a:fld id="{B61BEF0D-F0BB-DE4B-95CE-6DB70DBA9567}" type="datetimeFigureOut">
               <a:rPr lang="en-US" smtClean="0"/>
               <a:pPr/>
-              <a:t>10/16/2019</a:t>
+              <a:t>10/17/2019</a:t>
             </a:fld>
             <a:endParaRPr lang="en-US" dirty="0"/>
           </a:p>
@@ -7838,7 +7847,7 @@
             <a:fld id="{B61BEF0D-F0BB-DE4B-95CE-6DB70DBA9567}" type="datetimeFigureOut">
               <a:rPr lang="en-US" smtClean="0"/>
               <a:pPr/>
-              <a:t>10/16/2019</a:t>
+              <a:t>10/17/2019</a:t>
             </a:fld>
             <a:endParaRPr lang="en-US" dirty="0"/>
           </a:p>
@@ -8221,7 +8230,7 @@
             <a:fld id="{B61BEF0D-F0BB-DE4B-95CE-6DB70DBA9567}" type="datetimeFigureOut">
               <a:rPr lang="en-US" smtClean="0"/>
               <a:pPr/>
-              <a:t>10/16/2019</a:t>
+              <a:t>10/17/2019</a:t>
             </a:fld>
             <a:endParaRPr lang="en-US" dirty="0"/>
           </a:p>
@@ -8341,7 +8350,7 @@
             <a:fld id="{B61BEF0D-F0BB-DE4B-95CE-6DB70DBA9567}" type="datetimeFigureOut">
               <a:rPr lang="en-US" smtClean="0"/>
               <a:pPr/>
-              <a:t>10/16/2019</a:t>
+              <a:t>10/17/2019</a:t>
             </a:fld>
             <a:endParaRPr lang="en-US" dirty="0"/>
           </a:p>
@@ -8438,7 +8447,7 @@
             <a:fld id="{B61BEF0D-F0BB-DE4B-95CE-6DB70DBA9567}" type="datetimeFigureOut">
               <a:rPr lang="en-US" smtClean="0"/>
               <a:pPr/>
-              <a:t>10/16/2019</a:t>
+              <a:t>10/17/2019</a:t>
             </a:fld>
             <a:endParaRPr lang="en-US" dirty="0"/>
           </a:p>
@@ -8689,7 +8698,7 @@
             <a:fld id="{B61BEF0D-F0BB-DE4B-95CE-6DB70DBA9567}" type="datetimeFigureOut">
               <a:rPr lang="en-US" smtClean="0"/>
               <a:pPr/>
-              <a:t>10/16/2019</a:t>
+              <a:t>10/17/2019</a:t>
             </a:fld>
             <a:endParaRPr lang="en-US" dirty="0"/>
           </a:p>
@@ -8971,7 +8980,7 @@
             <a:fld id="{B61BEF0D-F0BB-DE4B-95CE-6DB70DBA9567}" type="datetimeFigureOut">
               <a:rPr lang="en-US" smtClean="0"/>
               <a:pPr/>
-              <a:t>10/16/2019</a:t>
+              <a:t>10/17/2019</a:t>
             </a:fld>
             <a:endParaRPr lang="en-US" dirty="0"/>
           </a:p>
@@ -9088,7 +9097,7 @@
           <a:noFill/>
           <a:extLst>
             <a:ext uri="{909E8E84-426E-40dd-AFC4-6F175D3DCCD1}">
-              <a14:hiddenFill xmlns:a14="http://schemas.microsoft.com/office/drawing/2010/main" xmlns="">
+              <a14:hiddenFill xmlns="" xmlns:a14="http://schemas.microsoft.com/office/drawing/2010/main">
                 <a:solidFill>
                   <a:srgbClr val="FFFFFF"/>
                 </a:solidFill>
@@ -9162,7 +9171,7 @@
               </a:ln>
               <a:extLst>
                 <a:ext uri="{91240B29-F687-4f45-9708-019B960494DF}">
-                  <a14:hiddenLine xmlns:a14="http://schemas.microsoft.com/office/drawing/2010/main" xmlns="" w="9525">
+                  <a14:hiddenLine xmlns="" xmlns:a14="http://schemas.microsoft.com/office/drawing/2010/main" w="9525">
                     <a:solidFill>
                       <a:srgbClr val="000000"/>
                     </a:solidFill>
@@ -9252,7 +9261,7 @@
               </a:ln>
               <a:extLst>
                 <a:ext uri="{91240B29-F687-4f45-9708-019B960494DF}">
-                  <a14:hiddenLine xmlns:a14="http://schemas.microsoft.com/office/drawing/2010/main" xmlns="" w="9525">
+                  <a14:hiddenLine xmlns="" xmlns:a14="http://schemas.microsoft.com/office/drawing/2010/main" w="9525">
                     <a:solidFill>
                       <a:srgbClr val="000000"/>
                     </a:solidFill>
@@ -9342,7 +9351,7 @@
               </a:ln>
               <a:extLst>
                 <a:ext uri="{91240B29-F687-4f45-9708-019B960494DF}">
-                  <a14:hiddenLine xmlns:a14="http://schemas.microsoft.com/office/drawing/2010/main" xmlns="" w="9525">
+                  <a14:hiddenLine xmlns="" xmlns:a14="http://schemas.microsoft.com/office/drawing/2010/main" w="9525">
                     <a:solidFill>
                       <a:srgbClr val="000000"/>
                     </a:solidFill>
@@ -9404,7 +9413,7 @@
               </a:ln>
               <a:extLst>
                 <a:ext uri="{91240B29-F687-4f45-9708-019B960494DF}">
-                  <a14:hiddenLine xmlns:a14="http://schemas.microsoft.com/office/drawing/2010/main" xmlns="" w="9525">
+                  <a14:hiddenLine xmlns="" xmlns:a14="http://schemas.microsoft.com/office/drawing/2010/main" w="9525">
                     <a:solidFill>
                       <a:srgbClr val="000000"/>
                     </a:solidFill>
@@ -9494,7 +9503,7 @@
               </a:ln>
               <a:extLst>
                 <a:ext uri="{91240B29-F687-4f45-9708-019B960494DF}">
-                  <a14:hiddenLine xmlns:a14="http://schemas.microsoft.com/office/drawing/2010/main" xmlns="" w="9525">
+                  <a14:hiddenLine xmlns="" xmlns:a14="http://schemas.microsoft.com/office/drawing/2010/main" w="9525">
                     <a:solidFill>
                       <a:srgbClr val="000000"/>
                     </a:solidFill>
@@ -9556,7 +9565,7 @@
               </a:ln>
               <a:extLst>
                 <a:ext uri="{91240B29-F687-4f45-9708-019B960494DF}">
-                  <a14:hiddenLine xmlns:a14="http://schemas.microsoft.com/office/drawing/2010/main" xmlns="" w="9525">
+                  <a14:hiddenLine xmlns="" xmlns:a14="http://schemas.microsoft.com/office/drawing/2010/main" w="9525">
                     <a:solidFill>
                       <a:srgbClr val="000000"/>
                     </a:solidFill>
@@ -9618,7 +9627,7 @@
               </a:ln>
               <a:extLst>
                 <a:ext uri="{91240B29-F687-4f45-9708-019B960494DF}">
-                  <a14:hiddenLine xmlns:a14="http://schemas.microsoft.com/office/drawing/2010/main" xmlns="" w="9525">
+                  <a14:hiddenLine xmlns="" xmlns:a14="http://schemas.microsoft.com/office/drawing/2010/main" w="9525">
                     <a:solidFill>
                       <a:srgbClr val="000000"/>
                     </a:solidFill>
@@ -9708,7 +9717,7 @@
               </a:ln>
               <a:extLst>
                 <a:ext uri="{91240B29-F687-4f45-9708-019B960494DF}">
-                  <a14:hiddenLine xmlns:a14="http://schemas.microsoft.com/office/drawing/2010/main" xmlns="" w="9525">
+                  <a14:hiddenLine xmlns="" xmlns:a14="http://schemas.microsoft.com/office/drawing/2010/main" w="9525">
                     <a:solidFill>
                       <a:srgbClr val="000000"/>
                     </a:solidFill>
@@ -9798,7 +9807,7 @@
               </a:ln>
               <a:extLst>
                 <a:ext uri="{91240B29-F687-4f45-9708-019B960494DF}">
-                  <a14:hiddenLine xmlns:a14="http://schemas.microsoft.com/office/drawing/2010/main" xmlns="" w="9525">
+                  <a14:hiddenLine xmlns="" xmlns:a14="http://schemas.microsoft.com/office/drawing/2010/main" w="9525">
                     <a:solidFill>
                       <a:srgbClr val="000000"/>
                     </a:solidFill>
@@ -9860,7 +9869,7 @@
               </a:ln>
               <a:extLst>
                 <a:ext uri="{91240B29-F687-4f45-9708-019B960494DF}">
-                  <a14:hiddenLine xmlns:a14="http://schemas.microsoft.com/office/drawing/2010/main" xmlns="" w="9525">
+                  <a14:hiddenLine xmlns="" xmlns:a14="http://schemas.microsoft.com/office/drawing/2010/main" w="9525">
                     <a:solidFill>
                       <a:srgbClr val="000000"/>
                     </a:solidFill>
@@ -9970,7 +9979,7 @@
               </a:ln>
               <a:extLst>
                 <a:ext uri="{91240B29-F687-4f45-9708-019B960494DF}">
-                  <a14:hiddenLine xmlns:a14="http://schemas.microsoft.com/office/drawing/2010/main" xmlns="" w="9525">
+                  <a14:hiddenLine xmlns="" xmlns:a14="http://schemas.microsoft.com/office/drawing/2010/main" w="9525">
                     <a:solidFill>
                       <a:srgbClr val="000000"/>
                     </a:solidFill>
@@ -10054,7 +10063,7 @@
               </a:ln>
               <a:extLst>
                 <a:ext uri="{91240B29-F687-4f45-9708-019B960494DF}">
-                  <a14:hiddenLine xmlns:a14="http://schemas.microsoft.com/office/drawing/2010/main" xmlns="" w="9525">
+                  <a14:hiddenLine xmlns="" xmlns:a14="http://schemas.microsoft.com/office/drawing/2010/main" w="9525">
                     <a:solidFill>
                       <a:srgbClr val="000000"/>
                     </a:solidFill>
@@ -10116,7 +10125,7 @@
               </a:ln>
               <a:extLst>
                 <a:ext uri="{91240B29-F687-4f45-9708-019B960494DF}">
-                  <a14:hiddenLine xmlns:a14="http://schemas.microsoft.com/office/drawing/2010/main" xmlns="" w="9525">
+                  <a14:hiddenLine xmlns="" xmlns:a14="http://schemas.microsoft.com/office/drawing/2010/main" w="9525">
                     <a:solidFill>
                       <a:srgbClr val="000000"/>
                     </a:solidFill>
@@ -10178,7 +10187,7 @@
               </a:ln>
               <a:extLst>
                 <a:ext uri="{91240B29-F687-4f45-9708-019B960494DF}">
-                  <a14:hiddenLine xmlns:a14="http://schemas.microsoft.com/office/drawing/2010/main" xmlns="" w="9525">
+                  <a14:hiddenLine xmlns="" xmlns:a14="http://schemas.microsoft.com/office/drawing/2010/main" w="9525">
                     <a:solidFill>
                       <a:srgbClr val="000000"/>
                     </a:solidFill>
@@ -10268,7 +10277,7 @@
               </a:ln>
               <a:extLst>
                 <a:ext uri="{91240B29-F687-4f45-9708-019B960494DF}">
-                  <a14:hiddenLine xmlns:a14="http://schemas.microsoft.com/office/drawing/2010/main" xmlns="" w="9525">
+                  <a14:hiddenLine xmlns="" xmlns:a14="http://schemas.microsoft.com/office/drawing/2010/main" w="9525">
                     <a:solidFill>
                       <a:srgbClr val="000000"/>
                     </a:solidFill>
@@ -10302,7 +10311,7 @@
               </a:ln>
               <a:extLst>
                 <a:ext uri="{91240B29-F687-4f45-9708-019B960494DF}">
-                  <a14:hiddenLine xmlns:a14="http://schemas.microsoft.com/office/drawing/2010/main" xmlns="" w="9525">
+                  <a14:hiddenLine xmlns="" xmlns:a14="http://schemas.microsoft.com/office/drawing/2010/main" w="9525">
                     <a:solidFill>
                       <a:srgbClr val="000000"/>
                     </a:solidFill>
@@ -10367,7 +10376,7 @@
               </a:ln>
               <a:extLst>
                 <a:ext uri="{91240B29-F687-4f45-9708-019B960494DF}">
-                  <a14:hiddenLine xmlns:a14="http://schemas.microsoft.com/office/drawing/2010/main" xmlns="" w="9525">
+                  <a14:hiddenLine xmlns="" xmlns:a14="http://schemas.microsoft.com/office/drawing/2010/main" w="9525">
                     <a:solidFill>
                       <a:srgbClr val="000000"/>
                     </a:solidFill>
@@ -10457,7 +10466,7 @@
               </a:ln>
               <a:extLst>
                 <a:ext uri="{91240B29-F687-4f45-9708-019B960494DF}">
-                  <a14:hiddenLine xmlns:a14="http://schemas.microsoft.com/office/drawing/2010/main" xmlns="" w="9525">
+                  <a14:hiddenLine xmlns="" xmlns:a14="http://schemas.microsoft.com/office/drawing/2010/main" w="9525">
                     <a:solidFill>
                       <a:srgbClr val="000000"/>
                     </a:solidFill>
@@ -10519,7 +10528,7 @@
               </a:ln>
               <a:extLst>
                 <a:ext uri="{91240B29-F687-4f45-9708-019B960494DF}">
-                  <a14:hiddenLine xmlns:a14="http://schemas.microsoft.com/office/drawing/2010/main" xmlns="" w="9525">
+                  <a14:hiddenLine xmlns="" xmlns:a14="http://schemas.microsoft.com/office/drawing/2010/main" w="9525">
                     <a:solidFill>
                       <a:srgbClr val="000000"/>
                     </a:solidFill>
@@ -10609,7 +10618,7 @@
               </a:ln>
               <a:extLst>
                 <a:ext uri="{91240B29-F687-4f45-9708-019B960494DF}">
-                  <a14:hiddenLine xmlns:a14="http://schemas.microsoft.com/office/drawing/2010/main" xmlns="" w="9525">
+                  <a14:hiddenLine xmlns="" xmlns:a14="http://schemas.microsoft.com/office/drawing/2010/main" w="9525">
                     <a:solidFill>
                       <a:srgbClr val="000000"/>
                     </a:solidFill>
@@ -10674,7 +10683,7 @@
               </a:ln>
               <a:extLst>
                 <a:ext uri="{91240B29-F687-4f45-9708-019B960494DF}">
-                  <a14:hiddenLine xmlns:a14="http://schemas.microsoft.com/office/drawing/2010/main" xmlns="" w="9525">
+                  <a14:hiddenLine xmlns="" xmlns:a14="http://schemas.microsoft.com/office/drawing/2010/main" w="9525">
                     <a:solidFill>
                       <a:srgbClr val="000000"/>
                     </a:solidFill>
@@ -10736,7 +10745,7 @@
               </a:ln>
               <a:extLst>
                 <a:ext uri="{91240B29-F687-4f45-9708-019B960494DF}">
-                  <a14:hiddenLine xmlns:a14="http://schemas.microsoft.com/office/drawing/2010/main" xmlns="" w="9525">
+                  <a14:hiddenLine xmlns="" xmlns:a14="http://schemas.microsoft.com/office/drawing/2010/main" w="9525">
                     <a:solidFill>
                       <a:srgbClr val="000000"/>
                     </a:solidFill>
@@ -10826,7 +10835,7 @@
               </a:ln>
               <a:extLst>
                 <a:ext uri="{91240B29-F687-4f45-9708-019B960494DF}">
-                  <a14:hiddenLine xmlns:a14="http://schemas.microsoft.com/office/drawing/2010/main" xmlns="" w="9525">
+                  <a14:hiddenLine xmlns="" xmlns:a14="http://schemas.microsoft.com/office/drawing/2010/main" w="9525">
                     <a:solidFill>
                       <a:srgbClr val="000000"/>
                     </a:solidFill>
@@ -10916,7 +10925,7 @@
               </a:ln>
               <a:extLst>
                 <a:ext uri="{91240B29-F687-4f45-9708-019B960494DF}">
-                  <a14:hiddenLine xmlns:a14="http://schemas.microsoft.com/office/drawing/2010/main" xmlns="" w="9525">
+                  <a14:hiddenLine xmlns="" xmlns:a14="http://schemas.microsoft.com/office/drawing/2010/main" w="9525">
                     <a:solidFill>
                       <a:srgbClr val="000000"/>
                     </a:solidFill>
@@ -10981,7 +10990,7 @@
               </a:ln>
               <a:extLst>
                 <a:ext uri="{91240B29-F687-4f45-9708-019B960494DF}">
-                  <a14:hiddenLine xmlns:a14="http://schemas.microsoft.com/office/drawing/2010/main" xmlns="" w="9525">
+                  <a14:hiddenLine xmlns="" xmlns:a14="http://schemas.microsoft.com/office/drawing/2010/main" w="9525">
                     <a:solidFill>
                       <a:srgbClr val="000000"/>
                     </a:solidFill>
@@ -11101,7 +11110,7 @@
               </a:ln>
               <a:extLst>
                 <a:ext uri="{91240B29-F687-4f45-9708-019B960494DF}">
-                  <a14:hiddenLine xmlns:a14="http://schemas.microsoft.com/office/drawing/2010/main" xmlns="" w="9525">
+                  <a14:hiddenLine xmlns="" xmlns:a14="http://schemas.microsoft.com/office/drawing/2010/main" w="9525">
                     <a:solidFill>
                       <a:srgbClr val="000000"/>
                     </a:solidFill>
@@ -11199,7 +11208,7 @@
               </a:ln>
               <a:extLst>
                 <a:ext uri="{91240B29-F687-4f45-9708-019B960494DF}">
-                  <a14:hiddenLine xmlns:a14="http://schemas.microsoft.com/office/drawing/2010/main" xmlns="" w="9525">
+                  <a14:hiddenLine xmlns="" xmlns:a14="http://schemas.microsoft.com/office/drawing/2010/main" w="9525">
                     <a:solidFill>
                       <a:srgbClr val="000000"/>
                     </a:solidFill>
@@ -11314,7 +11323,7 @@
               </a:ln>
               <a:extLst>
                 <a:ext uri="{91240B29-F687-4f45-9708-019B960494DF}">
-                  <a14:hiddenLine xmlns:a14="http://schemas.microsoft.com/office/drawing/2010/main" xmlns="" w="9525">
+                  <a14:hiddenLine xmlns="" xmlns:a14="http://schemas.microsoft.com/office/drawing/2010/main" w="9525">
                     <a:solidFill>
                       <a:srgbClr val="000000"/>
                     </a:solidFill>
@@ -11404,7 +11413,7 @@
               </a:ln>
               <a:extLst>
                 <a:ext uri="{91240B29-F687-4f45-9708-019B960494DF}">
-                  <a14:hiddenLine xmlns:a14="http://schemas.microsoft.com/office/drawing/2010/main" xmlns="" w="9525">
+                  <a14:hiddenLine xmlns="" xmlns:a14="http://schemas.microsoft.com/office/drawing/2010/main" w="9525">
                     <a:solidFill>
                       <a:srgbClr val="000000"/>
                     </a:solidFill>
@@ -11469,7 +11478,7 @@
               </a:ln>
               <a:extLst>
                 <a:ext uri="{91240B29-F687-4f45-9708-019B960494DF}">
-                  <a14:hiddenLine xmlns:a14="http://schemas.microsoft.com/office/drawing/2010/main" xmlns="" w="9525">
+                  <a14:hiddenLine xmlns="" xmlns:a14="http://schemas.microsoft.com/office/drawing/2010/main" w="9525">
                     <a:solidFill>
                       <a:srgbClr val="000000"/>
                     </a:solidFill>
@@ -11559,7 +11568,7 @@
               </a:ln>
               <a:extLst>
                 <a:ext uri="{91240B29-F687-4f45-9708-019B960494DF}">
-                  <a14:hiddenLine xmlns:a14="http://schemas.microsoft.com/office/drawing/2010/main" xmlns="" w="9525">
+                  <a14:hiddenLine xmlns="" xmlns:a14="http://schemas.microsoft.com/office/drawing/2010/main" w="9525">
                     <a:solidFill>
                       <a:srgbClr val="000000"/>
                     </a:solidFill>
@@ -11627,7 +11636,7 @@
               </a:ln>
               <a:extLst>
                 <a:ext uri="{91240B29-F687-4f45-9708-019B960494DF}">
-                  <a14:hiddenLine xmlns:a14="http://schemas.microsoft.com/office/drawing/2010/main" xmlns="" w="9525">
+                  <a14:hiddenLine xmlns="" xmlns:a14="http://schemas.microsoft.com/office/drawing/2010/main" w="9525">
                     <a:solidFill>
                       <a:srgbClr val="000000"/>
                     </a:solidFill>
@@ -11717,7 +11726,7 @@
               </a:ln>
               <a:extLst>
                 <a:ext uri="{91240B29-F687-4f45-9708-019B960494DF}">
-                  <a14:hiddenLine xmlns:a14="http://schemas.microsoft.com/office/drawing/2010/main" xmlns="" w="9525">
+                  <a14:hiddenLine xmlns="" xmlns:a14="http://schemas.microsoft.com/office/drawing/2010/main" w="9525">
                     <a:solidFill>
                       <a:srgbClr val="000000"/>
                     </a:solidFill>
@@ -11785,7 +11794,7 @@
               </a:ln>
               <a:extLst>
                 <a:ext uri="{91240B29-F687-4f45-9708-019B960494DF}">
-                  <a14:hiddenLine xmlns:a14="http://schemas.microsoft.com/office/drawing/2010/main" xmlns="" w="9525">
+                  <a14:hiddenLine xmlns="" xmlns:a14="http://schemas.microsoft.com/office/drawing/2010/main" w="9525">
                     <a:solidFill>
                       <a:srgbClr val="000000"/>
                     </a:solidFill>
@@ -11875,7 +11884,7 @@
               </a:ln>
               <a:extLst>
                 <a:ext uri="{91240B29-F687-4f45-9708-019B960494DF}">
-                  <a14:hiddenLine xmlns:a14="http://schemas.microsoft.com/office/drawing/2010/main" xmlns="" w="9525">
+                  <a14:hiddenLine xmlns="" xmlns:a14="http://schemas.microsoft.com/office/drawing/2010/main" w="9525">
                     <a:solidFill>
                       <a:srgbClr val="000000"/>
                     </a:solidFill>
@@ -11909,7 +11918,7 @@
               </a:ln>
               <a:extLst>
                 <a:ext uri="{91240B29-F687-4f45-9708-019B960494DF}">
-                  <a14:hiddenLine xmlns:a14="http://schemas.microsoft.com/office/drawing/2010/main" xmlns="" w="9525">
+                  <a14:hiddenLine xmlns="" xmlns:a14="http://schemas.microsoft.com/office/drawing/2010/main" w="9525">
                     <a:solidFill>
                       <a:srgbClr val="000000"/>
                     </a:solidFill>
@@ -12050,7 +12059,7 @@
             <a:fld id="{B61BEF0D-F0BB-DE4B-95CE-6DB70DBA9567}" type="datetimeFigureOut">
               <a:rPr lang="en-US" smtClean="0"/>
               <a:pPr/>
-              <a:t>10/16/2019</a:t>
+              <a:t>10/17/2019</a:t>
             </a:fld>
             <a:endParaRPr lang="en-US" dirty="0"/>
           </a:p>
@@ -13008,17 +13017,19 @@
           <a:p>
             <a:r>
               <a:rPr lang="en-US" dirty="0" smtClean="0"/>
-              <a:t>Waterfall/Agile</a:t>
-            </a:r>
-          </a:p>
-          <a:p>
+              <a:t>Agile </a:t>
+            </a:r>
+            <a:endParaRPr lang="en-US" dirty="0"/>
+          </a:p>
+          <a:p>
+            <a:pPr lvl="1"/>
             <a:r>
               <a:rPr lang="en-US" dirty="0" smtClean="0"/>
-              <a:t>Agile </a:t>
+              <a:t>How </a:t>
             </a:r>
             <a:r>
               <a:rPr lang="en-US" dirty="0"/>
-              <a:t>- How agile can be hard to tell what is how long will it take to complete the project.</a:t>
+              <a:t>agile can be hard to tell what is how long will it take to complete the project.</a:t>
             </a:r>
           </a:p>
           <a:p>
@@ -13059,15 +13070,38 @@
           </a:p>
           <a:p>
             <a:r>
+              <a:rPr lang="en-US" dirty="0" smtClean="0"/>
+              <a:t>Waterfall</a:t>
+            </a:r>
+          </a:p>
+          <a:p>
+            <a:pPr lvl="1"/>
+            <a:r>
+              <a:rPr lang="en-US" dirty="0" smtClean="0"/>
+              <a:t>Works </a:t>
+            </a:r>
+            <a:r>
               <a:rPr lang="en-US" dirty="0"/>
-              <a:t>Waterfall - works small scale. expected to get the product right the first time(</a:t>
-            </a:r>
-            <a:r>
-              <a:rPr lang="en-US" dirty="0" err="1"/>
+              <a:t>small scale. </a:t>
+            </a:r>
+            <a:r>
+              <a:rPr lang="en-US" dirty="0" smtClean="0"/>
+              <a:t>Expected </a:t>
+            </a:r>
+            <a:r>
+              <a:rPr lang="en-US" dirty="0"/>
+              <a:t>to get the product right the first </a:t>
+            </a:r>
+            <a:r>
+              <a:rPr lang="en-US" dirty="0" smtClean="0"/>
+              <a:t>time(</a:t>
+            </a:r>
+            <a:r>
+              <a:rPr lang="en-US" dirty="0" err="1" smtClean="0"/>
               <a:t>haha</a:t>
             </a:r>
             <a:r>
-              <a:rPr lang="en-US" dirty="0" smtClean="0"/>
+              <a:rPr lang="en-US" dirty="0"/>
               <a:t>)</a:t>
             </a:r>
             <a:endParaRPr lang="en-US" dirty="0"/>
@@ -13078,6 +13112,535 @@
     <p:extLst>
       <p:ext uri="{BB962C8B-B14F-4D97-AF65-F5344CB8AC3E}">
         <p14:creationId xmlns:p14="http://schemas.microsoft.com/office/powerpoint/2010/main" val="735001698"/>
+      </p:ext>
+    </p:extLst>
+  </p:cSld>
+  <p:clrMapOvr>
+    <a:masterClrMapping/>
+  </p:clrMapOvr>
+</p:sld>
+</file>
+
+<file path=ppt/slides/slide6.xml><?xml version="1.0" encoding="utf-8"?>
+<p:sld xmlns:a="http://schemas.openxmlformats.org/drawingml/2006/main" xmlns:r="http://schemas.openxmlformats.org/officeDocument/2006/relationships" xmlns:p="http://schemas.openxmlformats.org/presentationml/2006/main">
+  <p:cSld>
+    <p:spTree>
+      <p:nvGrpSpPr>
+        <p:cNvPr id="1" name=""/>
+        <p:cNvGrpSpPr/>
+        <p:nvPr/>
+      </p:nvGrpSpPr>
+      <p:grpSpPr>
+        <a:xfrm>
+          <a:off x="0" y="0"/>
+          <a:ext cx="0" cy="0"/>
+          <a:chOff x="0" y="0"/>
+          <a:chExt cx="0" cy="0"/>
+        </a:xfrm>
+      </p:grpSpPr>
+      <p:sp>
+        <p:nvSpPr>
+          <p:cNvPr id="2" name="Title 1"/>
+          <p:cNvSpPr>
+            <a:spLocks noGrp="1"/>
+          </p:cNvSpPr>
+          <p:nvPr>
+            <p:ph type="title"/>
+          </p:nvPr>
+        </p:nvSpPr>
+        <p:spPr/>
+        <p:txBody>
+          <a:bodyPr/>
+          <a:lstStyle/>
+          <a:p>
+            <a:r>
+              <a:rPr lang="en-US" dirty="0" smtClean="0"/>
+              <a:t>04 : </a:t>
+            </a:r>
+            <a:r>
+              <a:rPr lang="en-US" b="1" dirty="0"/>
+              <a:t>Configuration Management &amp; </a:t>
+            </a:r>
+            <a:r>
+              <a:rPr lang="en-US" b="1" dirty="0" smtClean="0"/>
+              <a:t>Bugs</a:t>
+            </a:r>
+            <a:endParaRPr lang="en-US" dirty="0"/>
+          </a:p>
+        </p:txBody>
+      </p:sp>
+      <p:sp>
+        <p:nvSpPr>
+          <p:cNvPr id="3" name="Content Placeholder 2"/>
+          <p:cNvSpPr>
+            <a:spLocks noGrp="1"/>
+          </p:cNvSpPr>
+          <p:nvPr>
+            <p:ph idx="1"/>
+          </p:nvPr>
+        </p:nvSpPr>
+        <p:spPr/>
+        <p:txBody>
+          <a:bodyPr>
+            <a:normAutofit lnSpcReduction="10000"/>
+          </a:bodyPr>
+          <a:lstStyle/>
+          <a:p>
+            <a:r>
+              <a:rPr lang="en-US" dirty="0"/>
+              <a:t>Configuration management</a:t>
+            </a:r>
+          </a:p>
+          <a:p>
+            <a:pPr lvl="1"/>
+            <a:r>
+              <a:rPr lang="en-US" dirty="0" err="1"/>
+              <a:t>Github</a:t>
+            </a:r>
+            <a:r>
+              <a:rPr lang="en-US" dirty="0"/>
+              <a:t>/GitLab</a:t>
+            </a:r>
+          </a:p>
+          <a:p>
+            <a:pPr lvl="1"/>
+            <a:r>
+              <a:rPr lang="en-US" dirty="0" err="1"/>
+              <a:t>GitFlow</a:t>
+            </a:r>
+            <a:r>
+              <a:rPr lang="en-US" dirty="0"/>
+              <a:t>, GitHub Flow, GitLab Flow</a:t>
+            </a:r>
+          </a:p>
+          <a:p>
+            <a:pPr lvl="1"/>
+            <a:r>
+              <a:rPr lang="en-US" dirty="0"/>
+              <a:t>Continuous Integration &amp; Continuous Test</a:t>
+            </a:r>
+          </a:p>
+          <a:p>
+            <a:r>
+              <a:rPr lang="en-US" dirty="0"/>
+              <a:t>Bugs</a:t>
+            </a:r>
+          </a:p>
+          <a:p>
+            <a:pPr lvl="1"/>
+            <a:r>
+              <a:rPr lang="en-US" dirty="0"/>
+              <a:t>Bug trackers: Trello, GitHub issues, Jira, </a:t>
+            </a:r>
+            <a:r>
+              <a:rPr lang="en-US" dirty="0" err="1"/>
+              <a:t>YouTrack</a:t>
+            </a:r>
+            <a:r>
+              <a:rPr lang="en-US" dirty="0"/>
+              <a:t>, </a:t>
+            </a:r>
+            <a:r>
+              <a:rPr lang="en-US" dirty="0" err="1"/>
+              <a:t>RallyCA</a:t>
+            </a:r>
+            <a:endParaRPr lang="en-US" dirty="0"/>
+          </a:p>
+          <a:p>
+            <a:pPr lvl="1"/>
+            <a:r>
+              <a:rPr lang="en-US" dirty="0"/>
+              <a:t>Bugs should be prioritized with work tasks</a:t>
+            </a:r>
+          </a:p>
+          <a:p>
+            <a:pPr lvl="1"/>
+            <a:r>
+              <a:rPr lang="en-US" dirty="0"/>
+              <a:t>Fix tests that break CT over developing code</a:t>
+            </a:r>
+          </a:p>
+          <a:p>
+            <a:endParaRPr lang="en-US" dirty="0"/>
+          </a:p>
+        </p:txBody>
+      </p:sp>
+    </p:spTree>
+    <p:extLst>
+      <p:ext uri="{BB962C8B-B14F-4D97-AF65-F5344CB8AC3E}">
+        <p14:creationId xmlns:p14="http://schemas.microsoft.com/office/powerpoint/2010/main" val="785305803"/>
+      </p:ext>
+    </p:extLst>
+  </p:cSld>
+  <p:clrMapOvr>
+    <a:masterClrMapping/>
+  </p:clrMapOvr>
+</p:sld>
+</file>
+
+<file path=ppt/slides/slide7.xml><?xml version="1.0" encoding="utf-8"?>
+<p:sld xmlns:a="http://schemas.openxmlformats.org/drawingml/2006/main" xmlns:r="http://schemas.openxmlformats.org/officeDocument/2006/relationships" xmlns:p="http://schemas.openxmlformats.org/presentationml/2006/main">
+  <p:cSld>
+    <p:spTree>
+      <p:nvGrpSpPr>
+        <p:cNvPr id="1" name=""/>
+        <p:cNvGrpSpPr/>
+        <p:nvPr/>
+      </p:nvGrpSpPr>
+      <p:grpSpPr>
+        <a:xfrm>
+          <a:off x="0" y="0"/>
+          <a:ext cx="0" cy="0"/>
+          <a:chOff x="0" y="0"/>
+          <a:chExt cx="0" cy="0"/>
+        </a:xfrm>
+      </p:grpSpPr>
+      <p:sp>
+        <p:nvSpPr>
+          <p:cNvPr id="2" name="Title 1"/>
+          <p:cNvSpPr>
+            <a:spLocks noGrp="1"/>
+          </p:cNvSpPr>
+          <p:nvPr>
+            <p:ph type="title"/>
+          </p:nvPr>
+        </p:nvSpPr>
+        <p:spPr/>
+        <p:txBody>
+          <a:bodyPr/>
+          <a:lstStyle/>
+          <a:p>
+            <a:r>
+              <a:rPr lang="en-US" dirty="0" smtClean="0"/>
+              <a:t>05 : </a:t>
+            </a:r>
+            <a:r>
+              <a:rPr lang="en-US" b="1" dirty="0"/>
+              <a:t>Design &amp; </a:t>
+            </a:r>
+            <a:r>
+              <a:rPr lang="en-US" b="1" dirty="0" smtClean="0"/>
+              <a:t>Reviews</a:t>
+            </a:r>
+            <a:endParaRPr lang="en-US" dirty="0"/>
+          </a:p>
+        </p:txBody>
+      </p:sp>
+      <p:sp>
+        <p:nvSpPr>
+          <p:cNvPr id="3" name="Content Placeholder 2"/>
+          <p:cNvSpPr>
+            <a:spLocks noGrp="1"/>
+          </p:cNvSpPr>
+          <p:nvPr>
+            <p:ph idx="1"/>
+          </p:nvPr>
+        </p:nvSpPr>
+        <p:spPr/>
+        <p:txBody>
+          <a:bodyPr>
+            <a:normAutofit fontScale="85000" lnSpcReduction="10000"/>
+          </a:bodyPr>
+          <a:lstStyle/>
+          <a:p>
+            <a:r>
+              <a:rPr lang="en-US" dirty="0"/>
+              <a:t>Design - Model based design</a:t>
+            </a:r>
+          </a:p>
+          <a:p>
+            <a:pPr lvl="1"/>
+            <a:r>
+              <a:rPr lang="en-US" dirty="0"/>
+              <a:t>Try to think end-to-end which includes test. In aviation test can be the most expensive</a:t>
+            </a:r>
+          </a:p>
+          <a:p>
+            <a:pPr lvl="1"/>
+            <a:r>
+              <a:rPr lang="en-US" dirty="0"/>
+              <a:t>When designing or making change make sure its scalable if you are working on a large project</a:t>
+            </a:r>
+          </a:p>
+          <a:p>
+            <a:pPr lvl="1"/>
+            <a:r>
+              <a:rPr lang="en-US" dirty="0"/>
+              <a:t>Change impact analysis - Many different layers, when you change something that might affect downstream artifacts(IMO) you should be responsible for notifying the impacts</a:t>
+            </a:r>
+          </a:p>
+          <a:p>
+            <a:pPr lvl="1"/>
+            <a:r>
+              <a:rPr lang="en-US" dirty="0"/>
+              <a:t>Failure using MBD with Low Level design models using </a:t>
+            </a:r>
+            <a:r>
+              <a:rPr lang="en-US" dirty="0" err="1"/>
+              <a:t>UMLet</a:t>
+            </a:r>
+            <a:endParaRPr lang="en-US" dirty="0"/>
+          </a:p>
+          <a:p>
+            <a:r>
+              <a:rPr lang="en-US" dirty="0"/>
+              <a:t>Reviews</a:t>
+            </a:r>
+          </a:p>
+          <a:p>
+            <a:pPr lvl="1"/>
+            <a:r>
+              <a:rPr lang="en-US" dirty="0"/>
+              <a:t>Google just release their review policy: </a:t>
+            </a:r>
+            <a:r>
+              <a:rPr lang="en-US" dirty="0">
+                <a:hlinkClick r:id="rId2"/>
+              </a:rPr>
+              <a:t>https://google.github.io/eng-practices/review/</a:t>
+            </a:r>
+            <a:endParaRPr lang="en-US" dirty="0"/>
+          </a:p>
+          <a:p>
+            <a:pPr lvl="1"/>
+            <a:r>
+              <a:rPr lang="en-US" dirty="0"/>
+              <a:t>Give clear deadlines and focus points. Prioritize reviews over new work.</a:t>
+            </a:r>
+          </a:p>
+          <a:p>
+            <a:endParaRPr lang="en-US" dirty="0"/>
+          </a:p>
+        </p:txBody>
+      </p:sp>
+    </p:spTree>
+    <p:extLst>
+      <p:ext uri="{BB962C8B-B14F-4D97-AF65-F5344CB8AC3E}">
+        <p14:creationId xmlns:p14="http://schemas.microsoft.com/office/powerpoint/2010/main" val="2255665340"/>
+      </p:ext>
+    </p:extLst>
+  </p:cSld>
+  <p:clrMapOvr>
+    <a:masterClrMapping/>
+  </p:clrMapOvr>
+</p:sld>
+</file>
+
+<file path=ppt/slides/slide8.xml><?xml version="1.0" encoding="utf-8"?>
+<p:sld xmlns:a="http://schemas.openxmlformats.org/drawingml/2006/main" xmlns:r="http://schemas.openxmlformats.org/officeDocument/2006/relationships" xmlns:p="http://schemas.openxmlformats.org/presentationml/2006/main">
+  <p:cSld>
+    <p:spTree>
+      <p:nvGrpSpPr>
+        <p:cNvPr id="1" name=""/>
+        <p:cNvGrpSpPr/>
+        <p:nvPr/>
+      </p:nvGrpSpPr>
+      <p:grpSpPr>
+        <a:xfrm>
+          <a:off x="0" y="0"/>
+          <a:ext cx="0" cy="0"/>
+          <a:chOff x="0" y="0"/>
+          <a:chExt cx="0" cy="0"/>
+        </a:xfrm>
+      </p:grpSpPr>
+      <p:sp>
+        <p:nvSpPr>
+          <p:cNvPr id="2" name="Title 1"/>
+          <p:cNvSpPr>
+            <a:spLocks noGrp="1"/>
+          </p:cNvSpPr>
+          <p:nvPr>
+            <p:ph type="title"/>
+          </p:nvPr>
+        </p:nvSpPr>
+        <p:spPr/>
+        <p:txBody>
+          <a:bodyPr/>
+          <a:lstStyle/>
+          <a:p>
+            <a:r>
+              <a:rPr lang="en-US" dirty="0" smtClean="0"/>
+              <a:t>06 : </a:t>
+            </a:r>
+            <a:r>
+              <a:rPr lang="en-US" b="1" dirty="0" smtClean="0"/>
+              <a:t>Roles of using software tooling</a:t>
+            </a:r>
+            <a:endParaRPr lang="en-US" dirty="0"/>
+          </a:p>
+        </p:txBody>
+      </p:sp>
+      <p:sp>
+        <p:nvSpPr>
+          <p:cNvPr id="3" name="Content Placeholder 2"/>
+          <p:cNvSpPr>
+            <a:spLocks noGrp="1"/>
+          </p:cNvSpPr>
+          <p:nvPr>
+            <p:ph idx="1"/>
+          </p:nvPr>
+        </p:nvSpPr>
+        <p:spPr/>
+        <p:txBody>
+          <a:bodyPr/>
+          <a:lstStyle/>
+          <a:p>
+            <a:r>
+              <a:rPr lang="en-US" dirty="0"/>
+              <a:t>Custom tools - They are nice but if you can get a COTS product I would tend to lead towards </a:t>
+            </a:r>
+            <a:r>
+              <a:rPr lang="en-US" dirty="0" smtClean="0"/>
+              <a:t>that</a:t>
+            </a:r>
+          </a:p>
+          <a:p>
+            <a:pPr lvl="1"/>
+            <a:r>
+              <a:rPr lang="en-US" dirty="0" smtClean="0"/>
+              <a:t>Always </a:t>
+            </a:r>
+            <a:r>
+              <a:rPr lang="en-US" dirty="0"/>
+              <a:t>think about who is going to maintain this tool in the future.</a:t>
+            </a:r>
+          </a:p>
+          <a:p>
+            <a:endParaRPr lang="en-US" dirty="0"/>
+          </a:p>
+        </p:txBody>
+      </p:sp>
+    </p:spTree>
+    <p:extLst>
+      <p:ext uri="{BB962C8B-B14F-4D97-AF65-F5344CB8AC3E}">
+        <p14:creationId xmlns:p14="http://schemas.microsoft.com/office/powerpoint/2010/main" val="2678943324"/>
+      </p:ext>
+    </p:extLst>
+  </p:cSld>
+  <p:clrMapOvr>
+    <a:masterClrMapping/>
+  </p:clrMapOvr>
+</p:sld>
+</file>
+
+<file path=ppt/slides/slide9.xml><?xml version="1.0" encoding="utf-8"?>
+<p:sld xmlns:a="http://schemas.openxmlformats.org/drawingml/2006/main" xmlns:r="http://schemas.openxmlformats.org/officeDocument/2006/relationships" xmlns:p="http://schemas.openxmlformats.org/presentationml/2006/main">
+  <p:cSld>
+    <p:spTree>
+      <p:nvGrpSpPr>
+        <p:cNvPr id="1" name=""/>
+        <p:cNvGrpSpPr/>
+        <p:nvPr/>
+      </p:nvGrpSpPr>
+      <p:grpSpPr>
+        <a:xfrm>
+          <a:off x="0" y="0"/>
+          <a:ext cx="0" cy="0"/>
+          <a:chOff x="0" y="0"/>
+          <a:chExt cx="0" cy="0"/>
+        </a:xfrm>
+      </p:grpSpPr>
+      <p:sp>
+        <p:nvSpPr>
+          <p:cNvPr id="2" name="Title 1"/>
+          <p:cNvSpPr>
+            <a:spLocks noGrp="1"/>
+          </p:cNvSpPr>
+          <p:nvPr>
+            <p:ph type="title"/>
+          </p:nvPr>
+        </p:nvSpPr>
+        <p:spPr/>
+        <p:txBody>
+          <a:bodyPr/>
+          <a:lstStyle/>
+          <a:p>
+            <a:r>
+              <a:rPr lang="en-US" dirty="0" smtClean="0"/>
+              <a:t>07 : </a:t>
+            </a:r>
+            <a:r>
+              <a:rPr lang="en-US" b="1" dirty="0"/>
+              <a:t>Software </a:t>
+            </a:r>
+            <a:r>
+              <a:rPr lang="en-US" b="1" dirty="0" smtClean="0"/>
+              <a:t>reuse</a:t>
+            </a:r>
+            <a:endParaRPr lang="en-US" dirty="0"/>
+          </a:p>
+        </p:txBody>
+      </p:sp>
+      <p:sp>
+        <p:nvSpPr>
+          <p:cNvPr id="3" name="Content Placeholder 2"/>
+          <p:cNvSpPr>
+            <a:spLocks noGrp="1"/>
+          </p:cNvSpPr>
+          <p:nvPr>
+            <p:ph idx="1"/>
+          </p:nvPr>
+        </p:nvSpPr>
+        <p:spPr/>
+        <p:txBody>
+          <a:bodyPr/>
+          <a:lstStyle/>
+          <a:p>
+            <a:r>
+              <a:rPr lang="en-US" dirty="0"/>
+              <a:t>Product Line </a:t>
+            </a:r>
+            <a:r>
+              <a:rPr lang="en-US" dirty="0" err="1"/>
+              <a:t>engineeringNeed</a:t>
+            </a:r>
+            <a:r>
+              <a:rPr lang="en-US" dirty="0"/>
+              <a:t> good systems engineers that knows the product(s)</a:t>
+            </a:r>
+          </a:p>
+          <a:p>
+            <a:r>
+              <a:rPr lang="en-US" dirty="0"/>
+              <a:t>How to split up the project</a:t>
+            </a:r>
+          </a:p>
+          <a:p>
+            <a:pPr lvl="1"/>
+            <a:r>
+              <a:rPr lang="en-US" dirty="0"/>
+              <a:t>Use configuration files</a:t>
+            </a:r>
+          </a:p>
+          <a:p>
+            <a:pPr lvl="1"/>
+            <a:r>
+              <a:rPr lang="en-US" dirty="0"/>
+              <a:t>All variations in 1 project &amp; just have different UI's or interfaces to customer</a:t>
+            </a:r>
+          </a:p>
+          <a:p>
+            <a:pPr lvl="1"/>
+            <a:r>
+              <a:rPr lang="en-US" dirty="0"/>
+              <a:t>Complete different projects</a:t>
+            </a:r>
+          </a:p>
+          <a:p>
+            <a:r>
+              <a:rPr lang="en-US"/>
+              <a:t>CM is a big part if you want to be efficient on reusing artifacts.</a:t>
+            </a:r>
+          </a:p>
+          <a:p>
+            <a:endParaRPr lang="en-US"/>
+          </a:p>
+        </p:txBody>
+      </p:sp>
+    </p:spTree>
+    <p:extLst>
+      <p:ext uri="{BB962C8B-B14F-4D97-AF65-F5344CB8AC3E}">
+        <p14:creationId xmlns:p14="http://schemas.microsoft.com/office/powerpoint/2010/main" val="2267400893"/>
       </p:ext>
     </p:extLst>
   </p:cSld>

</xml_diff>